<commit_message>
added names for slides in notes
</commit_message>
<xml_diff>
--- a/Documents/Presentation/Presentation_MobileMotionTrackingRobotArm.pptx
+++ b/Documents/Presentation/Presentation_MobileMotionTrackingRobotArm.pptx
@@ -535,46 +535,7 @@
           <a:bodyPr/>
           <a:lstStyle/>
           <a:p>
-            <a:pPr marL="171450" indent="-171450">
-              <a:buFont typeface="Arial" panose="020B0604020202020204" pitchFamily="34" charset="0"/>
-              <a:buChar char="•"/>
-            </a:pPr>
-            <a:r>
-              <a:rPr lang="en-US" dirty="0" smtClean="0"/>
-              <a:t>Structured</a:t>
-            </a:r>
-            <a:r>
-              <a:rPr lang="en-US" baseline="0" dirty="0" smtClean="0"/>
-              <a:t> light: IR emitter emits pattern of infrared light, pattern gets distorted by objects in room.  IR Depth Sensor detects distortions and uses it to create depth map.</a:t>
-            </a:r>
-          </a:p>
-          <a:p>
-            <a:pPr marL="171450" marR="0" indent="-171450" algn="l" defTabSz="914400" rtl="0" eaLnBrk="1" fontAlgn="auto" latinLnBrk="0" hangingPunct="1">
-              <a:lnSpc>
-                <a:spcPct val="100000"/>
-              </a:lnSpc>
-              <a:spcBef>
-                <a:spcPts val="0"/>
-              </a:spcBef>
-              <a:spcAft>
-                <a:spcPts val="0"/>
-              </a:spcAft>
-              <a:buClrTx/>
-              <a:buSzTx/>
-              <a:buFont typeface="Arial" panose="020B0604020202020204" pitchFamily="34" charset="0"/>
-              <a:buChar char="•"/>
-              <a:tabLst/>
-              <a:defRPr/>
-            </a:pPr>
-            <a:r>
-              <a:rPr lang="en-US" dirty="0" smtClean="0"/>
-              <a:t>Depth map passed through machine learning algorithm</a:t>
-            </a:r>
-            <a:r>
-              <a:rPr lang="en-US" baseline="0" dirty="0" smtClean="0"/>
-              <a:t> to determine body positions in the room.</a:t>
-            </a:r>
-            <a:endParaRPr lang="en-US" dirty="0" smtClean="0"/>
+            <a:endParaRPr lang="en-US" dirty="0"/>
           </a:p>
         </p:txBody>
       </p:sp>
@@ -595,7 +556,7 @@
           <a:p>
             <a:fld id="{3B17A12C-C4E2-4206-8C18-BBFF2A1087F6}" type="slidenum">
               <a:rPr lang="en-US" smtClean="0"/>
-              <a:t>4</a:t>
+              <a:t>2</a:t>
             </a:fld>
             <a:endParaRPr lang="en-US"/>
           </a:p>
@@ -604,7 +565,7 @@
     </p:spTree>
     <p:extLst>
       <p:ext uri="{BB962C8B-B14F-4D97-AF65-F5344CB8AC3E}">
-        <p14:creationId xmlns:p14="http://schemas.microsoft.com/office/powerpoint/2010/main" val="3890657980"/>
+        <p14:creationId xmlns:p14="http://schemas.microsoft.com/office/powerpoint/2010/main" val="709508197"/>
       </p:ext>
     </p:extLst>
   </p:cSld>
@@ -658,13 +619,428 @@
           <a:bodyPr/>
           <a:lstStyle/>
           <a:p>
+            <a:endParaRPr lang="en-US" dirty="0"/>
+          </a:p>
+        </p:txBody>
+      </p:sp>
+      <p:sp>
+        <p:nvSpPr>
+          <p:cNvPr id="4" name="Slide Number Placeholder 3"/>
+          <p:cNvSpPr>
+            <a:spLocks noGrp="1"/>
+          </p:cNvSpPr>
+          <p:nvPr>
+            <p:ph type="sldNum" sz="quarter" idx="10"/>
+          </p:nvPr>
+        </p:nvSpPr>
+        <p:spPr/>
+        <p:txBody>
+          <a:bodyPr/>
+          <a:lstStyle/>
+          <a:p>
+            <a:fld id="{3B17A12C-C4E2-4206-8C18-BBFF2A1087F6}" type="slidenum">
+              <a:rPr lang="en-US" smtClean="0"/>
+              <a:t>3</a:t>
+            </a:fld>
+            <a:endParaRPr lang="en-US"/>
+          </a:p>
+        </p:txBody>
+      </p:sp>
+    </p:spTree>
+    <p:extLst>
+      <p:ext uri="{BB962C8B-B14F-4D97-AF65-F5344CB8AC3E}">
+        <p14:creationId xmlns:p14="http://schemas.microsoft.com/office/powerpoint/2010/main" val="254859936"/>
+      </p:ext>
+    </p:extLst>
+  </p:cSld>
+  <p:clrMapOvr>
+    <a:masterClrMapping/>
+  </p:clrMapOvr>
+</p:notes>
+</file>
+
+<file path=ppt/notesSlides/notesSlide3.xml><?xml version="1.0" encoding="utf-8"?>
+<p:notes xmlns:a="http://schemas.openxmlformats.org/drawingml/2006/main" xmlns:r="http://schemas.openxmlformats.org/officeDocument/2006/relationships" xmlns:p="http://schemas.openxmlformats.org/presentationml/2006/main">
+  <p:cSld>
+    <p:spTree>
+      <p:nvGrpSpPr>
+        <p:cNvPr id="1" name=""/>
+        <p:cNvGrpSpPr/>
+        <p:nvPr/>
+      </p:nvGrpSpPr>
+      <p:grpSpPr>
+        <a:xfrm>
+          <a:off x="0" y="0"/>
+          <a:ext cx="0" cy="0"/>
+          <a:chOff x="0" y="0"/>
+          <a:chExt cx="0" cy="0"/>
+        </a:xfrm>
+      </p:grpSpPr>
+      <p:sp>
+        <p:nvSpPr>
+          <p:cNvPr id="2" name="Slide Image Placeholder 1"/>
+          <p:cNvSpPr>
+            <a:spLocks noGrp="1" noRot="1" noChangeAspect="1"/>
+          </p:cNvSpPr>
+          <p:nvPr>
+            <p:ph type="sldImg"/>
+          </p:nvPr>
+        </p:nvSpPr>
+        <p:spPr/>
+      </p:sp>
+      <p:sp>
+        <p:nvSpPr>
+          <p:cNvPr id="3" name="Notes Placeholder 2"/>
+          <p:cNvSpPr>
+            <a:spLocks noGrp="1"/>
+          </p:cNvSpPr>
+          <p:nvPr>
+            <p:ph type="body" idx="1"/>
+          </p:nvPr>
+        </p:nvSpPr>
+        <p:spPr/>
+        <p:txBody>
+          <a:bodyPr/>
+          <a:lstStyle/>
+          <a:p>
+            <a:pPr marL="0" indent="0">
+              <a:buFont typeface="Arial" panose="020B0604020202020204" pitchFamily="34" charset="0"/>
+              <a:buNone/>
+            </a:pPr>
+            <a:r>
+              <a:rPr lang="en-US" dirty="0" smtClean="0"/>
+              <a:t>- Jeff R.</a:t>
+            </a:r>
+          </a:p>
+          <a:p>
             <a:pPr marL="171450" indent="-171450">
               <a:buFont typeface="Arial" panose="020B0604020202020204" pitchFamily="34" charset="0"/>
               <a:buChar char="•"/>
             </a:pPr>
             <a:r>
               <a:rPr lang="en-US" dirty="0" smtClean="0"/>
-              <a:t>Kinect SDK has skeleton stream – stores information about each joint (coordinates)</a:t>
+              <a:t>Structured</a:t>
+            </a:r>
+            <a:r>
+              <a:rPr lang="en-US" baseline="0" dirty="0" smtClean="0"/>
+              <a:t> </a:t>
+            </a:r>
+            <a:r>
+              <a:rPr lang="en-US" baseline="0" dirty="0" smtClean="0"/>
+              <a:t>light: IR emitter emits pattern of infrared light, pattern gets distorted by objects in room.  IR Depth Sensor detects distortions and uses it to create depth map.</a:t>
+            </a:r>
+          </a:p>
+          <a:p>
+            <a:pPr marL="171450" marR="0" indent="-171450" algn="l" defTabSz="914400" rtl="0" eaLnBrk="1" fontAlgn="auto" latinLnBrk="0" hangingPunct="1">
+              <a:lnSpc>
+                <a:spcPct val="100000"/>
+              </a:lnSpc>
+              <a:spcBef>
+                <a:spcPts val="0"/>
+              </a:spcBef>
+              <a:spcAft>
+                <a:spcPts val="0"/>
+              </a:spcAft>
+              <a:buClrTx/>
+              <a:buSzTx/>
+              <a:buFont typeface="Arial" panose="020B0604020202020204" pitchFamily="34" charset="0"/>
+              <a:buChar char="•"/>
+              <a:tabLst/>
+              <a:defRPr/>
+            </a:pPr>
+            <a:r>
+              <a:rPr lang="en-US" dirty="0" smtClean="0"/>
+              <a:t>Depth map passed through machine learning algorithm</a:t>
+            </a:r>
+            <a:r>
+              <a:rPr lang="en-US" baseline="0" dirty="0" smtClean="0"/>
+              <a:t> to determine body positions in the room.</a:t>
+            </a:r>
+            <a:endParaRPr lang="en-US" dirty="0" smtClean="0"/>
+          </a:p>
+        </p:txBody>
+      </p:sp>
+      <p:sp>
+        <p:nvSpPr>
+          <p:cNvPr id="4" name="Slide Number Placeholder 3"/>
+          <p:cNvSpPr>
+            <a:spLocks noGrp="1"/>
+          </p:cNvSpPr>
+          <p:nvPr>
+            <p:ph type="sldNum" sz="quarter" idx="10"/>
+          </p:nvPr>
+        </p:nvSpPr>
+        <p:spPr/>
+        <p:txBody>
+          <a:bodyPr/>
+          <a:lstStyle/>
+          <a:p>
+            <a:fld id="{3B17A12C-C4E2-4206-8C18-BBFF2A1087F6}" type="slidenum">
+              <a:rPr lang="en-US" smtClean="0"/>
+              <a:t>4</a:t>
+            </a:fld>
+            <a:endParaRPr lang="en-US"/>
+          </a:p>
+        </p:txBody>
+      </p:sp>
+    </p:spTree>
+    <p:extLst>
+      <p:ext uri="{BB962C8B-B14F-4D97-AF65-F5344CB8AC3E}">
+        <p14:creationId xmlns:p14="http://schemas.microsoft.com/office/powerpoint/2010/main" val="3890657980"/>
+      </p:ext>
+    </p:extLst>
+  </p:cSld>
+  <p:clrMapOvr>
+    <a:masterClrMapping/>
+  </p:clrMapOvr>
+</p:notes>
+</file>
+
+<file path=ppt/notesSlides/notesSlide4.xml><?xml version="1.0" encoding="utf-8"?>
+<p:notes xmlns:a="http://schemas.openxmlformats.org/drawingml/2006/main" xmlns:r="http://schemas.openxmlformats.org/officeDocument/2006/relationships" xmlns:p="http://schemas.openxmlformats.org/presentationml/2006/main">
+  <p:cSld>
+    <p:spTree>
+      <p:nvGrpSpPr>
+        <p:cNvPr id="1" name=""/>
+        <p:cNvGrpSpPr/>
+        <p:nvPr/>
+      </p:nvGrpSpPr>
+      <p:grpSpPr>
+        <a:xfrm>
+          <a:off x="0" y="0"/>
+          <a:ext cx="0" cy="0"/>
+          <a:chOff x="0" y="0"/>
+          <a:chExt cx="0" cy="0"/>
+        </a:xfrm>
+      </p:grpSpPr>
+      <p:sp>
+        <p:nvSpPr>
+          <p:cNvPr id="2" name="Slide Image Placeholder 1"/>
+          <p:cNvSpPr>
+            <a:spLocks noGrp="1" noRot="1" noChangeAspect="1"/>
+          </p:cNvSpPr>
+          <p:nvPr>
+            <p:ph type="sldImg"/>
+          </p:nvPr>
+        </p:nvSpPr>
+        <p:spPr/>
+      </p:sp>
+      <p:sp>
+        <p:nvSpPr>
+          <p:cNvPr id="3" name="Notes Placeholder 2"/>
+          <p:cNvSpPr>
+            <a:spLocks noGrp="1"/>
+          </p:cNvSpPr>
+          <p:nvPr>
+            <p:ph type="body" idx="1"/>
+          </p:nvPr>
+        </p:nvSpPr>
+        <p:spPr/>
+        <p:txBody>
+          <a:bodyPr/>
+          <a:lstStyle/>
+          <a:p>
+            <a:r>
+              <a:rPr lang="en-US" dirty="0" smtClean="0"/>
+              <a:t>- </a:t>
+            </a:r>
+            <a:r>
+              <a:rPr lang="en-US" dirty="0" err="1" smtClean="0"/>
+              <a:t>Getro</a:t>
+            </a:r>
+            <a:endParaRPr lang="en-US" dirty="0"/>
+          </a:p>
+        </p:txBody>
+      </p:sp>
+      <p:sp>
+        <p:nvSpPr>
+          <p:cNvPr id="4" name="Slide Number Placeholder 3"/>
+          <p:cNvSpPr>
+            <a:spLocks noGrp="1"/>
+          </p:cNvSpPr>
+          <p:nvPr>
+            <p:ph type="sldNum" sz="quarter" idx="10"/>
+          </p:nvPr>
+        </p:nvSpPr>
+        <p:spPr/>
+        <p:txBody>
+          <a:bodyPr/>
+          <a:lstStyle/>
+          <a:p>
+            <a:fld id="{3B17A12C-C4E2-4206-8C18-BBFF2A1087F6}" type="slidenum">
+              <a:rPr lang="en-US" smtClean="0"/>
+              <a:t>5</a:t>
+            </a:fld>
+            <a:endParaRPr lang="en-US"/>
+          </a:p>
+        </p:txBody>
+      </p:sp>
+    </p:spTree>
+    <p:extLst>
+      <p:ext uri="{BB962C8B-B14F-4D97-AF65-F5344CB8AC3E}">
+        <p14:creationId xmlns:p14="http://schemas.microsoft.com/office/powerpoint/2010/main" val="2819634273"/>
+      </p:ext>
+    </p:extLst>
+  </p:cSld>
+  <p:clrMapOvr>
+    <a:masterClrMapping/>
+  </p:clrMapOvr>
+</p:notes>
+</file>
+
+<file path=ppt/notesSlides/notesSlide5.xml><?xml version="1.0" encoding="utf-8"?>
+<p:notes xmlns:a="http://schemas.openxmlformats.org/drawingml/2006/main" xmlns:r="http://schemas.openxmlformats.org/officeDocument/2006/relationships" xmlns:p="http://schemas.openxmlformats.org/presentationml/2006/main">
+  <p:cSld>
+    <p:spTree>
+      <p:nvGrpSpPr>
+        <p:cNvPr id="1" name=""/>
+        <p:cNvGrpSpPr/>
+        <p:nvPr/>
+      </p:nvGrpSpPr>
+      <p:grpSpPr>
+        <a:xfrm>
+          <a:off x="0" y="0"/>
+          <a:ext cx="0" cy="0"/>
+          <a:chOff x="0" y="0"/>
+          <a:chExt cx="0" cy="0"/>
+        </a:xfrm>
+      </p:grpSpPr>
+      <p:sp>
+        <p:nvSpPr>
+          <p:cNvPr id="2" name="Slide Image Placeholder 1"/>
+          <p:cNvSpPr>
+            <a:spLocks noGrp="1" noRot="1" noChangeAspect="1"/>
+          </p:cNvSpPr>
+          <p:nvPr>
+            <p:ph type="sldImg"/>
+          </p:nvPr>
+        </p:nvSpPr>
+        <p:spPr/>
+      </p:sp>
+      <p:sp>
+        <p:nvSpPr>
+          <p:cNvPr id="3" name="Notes Placeholder 2"/>
+          <p:cNvSpPr>
+            <a:spLocks noGrp="1"/>
+          </p:cNvSpPr>
+          <p:nvPr>
+            <p:ph type="body" idx="1"/>
+          </p:nvPr>
+        </p:nvSpPr>
+        <p:spPr/>
+        <p:txBody>
+          <a:bodyPr/>
+          <a:lstStyle/>
+          <a:p>
+            <a:r>
+              <a:rPr lang="en-US" dirty="0" smtClean="0"/>
+              <a:t>- Jeff F.</a:t>
+            </a:r>
+            <a:endParaRPr lang="en-US" dirty="0"/>
+          </a:p>
+        </p:txBody>
+      </p:sp>
+      <p:sp>
+        <p:nvSpPr>
+          <p:cNvPr id="4" name="Slide Number Placeholder 3"/>
+          <p:cNvSpPr>
+            <a:spLocks noGrp="1"/>
+          </p:cNvSpPr>
+          <p:nvPr>
+            <p:ph type="sldNum" sz="quarter" idx="10"/>
+          </p:nvPr>
+        </p:nvSpPr>
+        <p:spPr/>
+        <p:txBody>
+          <a:bodyPr/>
+          <a:lstStyle/>
+          <a:p>
+            <a:fld id="{3B17A12C-C4E2-4206-8C18-BBFF2A1087F6}" type="slidenum">
+              <a:rPr lang="en-US" smtClean="0"/>
+              <a:t>8</a:t>
+            </a:fld>
+            <a:endParaRPr lang="en-US"/>
+          </a:p>
+        </p:txBody>
+      </p:sp>
+    </p:spTree>
+    <p:extLst>
+      <p:ext uri="{BB962C8B-B14F-4D97-AF65-F5344CB8AC3E}">
+        <p14:creationId xmlns:p14="http://schemas.microsoft.com/office/powerpoint/2010/main" val="2274555985"/>
+      </p:ext>
+    </p:extLst>
+  </p:cSld>
+  <p:clrMapOvr>
+    <a:masterClrMapping/>
+  </p:clrMapOvr>
+</p:notes>
+</file>
+
+<file path=ppt/notesSlides/notesSlide6.xml><?xml version="1.0" encoding="utf-8"?>
+<p:notes xmlns:a="http://schemas.openxmlformats.org/drawingml/2006/main" xmlns:r="http://schemas.openxmlformats.org/officeDocument/2006/relationships" xmlns:p="http://schemas.openxmlformats.org/presentationml/2006/main">
+  <p:cSld>
+    <p:spTree>
+      <p:nvGrpSpPr>
+        <p:cNvPr id="1" name=""/>
+        <p:cNvGrpSpPr/>
+        <p:nvPr/>
+      </p:nvGrpSpPr>
+      <p:grpSpPr>
+        <a:xfrm>
+          <a:off x="0" y="0"/>
+          <a:ext cx="0" cy="0"/>
+          <a:chOff x="0" y="0"/>
+          <a:chExt cx="0" cy="0"/>
+        </a:xfrm>
+      </p:grpSpPr>
+      <p:sp>
+        <p:nvSpPr>
+          <p:cNvPr id="2" name="Slide Image Placeholder 1"/>
+          <p:cNvSpPr>
+            <a:spLocks noGrp="1" noRot="1" noChangeAspect="1"/>
+          </p:cNvSpPr>
+          <p:nvPr>
+            <p:ph type="sldImg"/>
+          </p:nvPr>
+        </p:nvSpPr>
+        <p:spPr/>
+      </p:sp>
+      <p:sp>
+        <p:nvSpPr>
+          <p:cNvPr id="3" name="Notes Placeholder 2"/>
+          <p:cNvSpPr>
+            <a:spLocks noGrp="1"/>
+          </p:cNvSpPr>
+          <p:nvPr>
+            <p:ph type="body" idx="1"/>
+          </p:nvPr>
+        </p:nvSpPr>
+        <p:spPr/>
+        <p:txBody>
+          <a:bodyPr/>
+          <a:lstStyle/>
+          <a:p>
+            <a:pPr marL="0" indent="0">
+              <a:buFont typeface="Arial" panose="020B0604020202020204" pitchFamily="34" charset="0"/>
+              <a:buNone/>
+            </a:pPr>
+            <a:r>
+              <a:rPr lang="en-US" dirty="0" smtClean="0"/>
+              <a:t>- Jeff R.</a:t>
+            </a:r>
+          </a:p>
+          <a:p>
+            <a:pPr marL="171450" indent="-171450">
+              <a:buFont typeface="Arial" panose="020B0604020202020204" pitchFamily="34" charset="0"/>
+              <a:buChar char="•"/>
+            </a:pPr>
+            <a:r>
+              <a:rPr lang="en-US" dirty="0" smtClean="0"/>
+              <a:t>Kinect </a:t>
+            </a:r>
+            <a:r>
+              <a:rPr lang="en-US" dirty="0" smtClean="0"/>
+              <a:t>SDK has skeleton stream – stores information about each joint (coordinates)</a:t>
             </a:r>
           </a:p>
           <a:p>
@@ -756,7 +1132,7 @@
 </p:notes>
 </file>
 
-<file path=ppt/notesSlides/notesSlide3.xml><?xml version="1.0" encoding="utf-8"?>
+<file path=ppt/notesSlides/notesSlide7.xml><?xml version="1.0" encoding="utf-8"?>
 <p:notes xmlns:a="http://schemas.openxmlformats.org/drawingml/2006/main" xmlns:r="http://schemas.openxmlformats.org/officeDocument/2006/relationships" xmlns:p="http://schemas.openxmlformats.org/presentationml/2006/main">
   <p:cSld>
     <p:spTree>
@@ -4996,7 +5372,6 @@
               <a:rPr lang="en-US" dirty="0" smtClean="0"/>
               <a:t>view</a:t>
             </a:r>
-            <a:endParaRPr lang="en-US" dirty="0" smtClean="0"/>
           </a:p>
           <a:p>
             <a:r>
@@ -5089,29 +5464,8 @@
           <a:p>
             <a:r>
               <a:rPr lang="en-US" dirty="0" smtClean="0"/>
-              <a:t>Skeletal </a:t>
-            </a:r>
-            <a:r>
-              <a:rPr lang="en-US" dirty="0" smtClean="0"/>
-              <a:t>tracking done </a:t>
-            </a:r>
-            <a:r>
-              <a:rPr lang="en-US" dirty="0" smtClean="0"/>
-              <a:t>using </a:t>
-            </a:r>
-            <a:r>
-              <a:rPr lang="en-US" dirty="0" smtClean="0"/>
-              <a:t>Kinect </a:t>
-            </a:r>
-            <a:r>
-              <a:rPr lang="en-US" dirty="0" smtClean="0"/>
-              <a:t>for Windows </a:t>
-            </a:r>
-            <a:r>
-              <a:rPr lang="en-US" dirty="0" smtClean="0"/>
-              <a:t>SDK v1.8</a:t>
-            </a:r>
-            <a:endParaRPr lang="en-US" dirty="0" smtClean="0"/>
+              <a:t>Skeletal tracking done using Kinect for Windows SDK v1.8</a:t>
+            </a:r>
           </a:p>
           <a:p>
             <a:r>
@@ -5199,17 +5553,12 @@
             </a:r>
             <a:r>
               <a:rPr lang="en-US" dirty="0" err="1" smtClean="0"/>
-              <a:t>HandClose</a:t>
-            </a:r>
-            <a:r>
-              <a:rPr lang="en-US" dirty="0" err="1" smtClean="0"/>
-              <a:t>d</a:t>
+              <a:t>HandClosed</a:t>
             </a:r>
             <a:r>
               <a:rPr lang="en-US" dirty="0" smtClean="0"/>
               <a:t>”</a:t>
             </a:r>
-            <a:endParaRPr lang="en-US" dirty="0" smtClean="0"/>
           </a:p>
         </p:txBody>
       </p:sp>
@@ -5378,7 +5727,6 @@
               <a:rPr lang="en-US" dirty="0" smtClean="0"/>
               <a:t>Calculate servo positions from servo angles (linear regression)</a:t>
             </a:r>
-            <a:endParaRPr lang="en-US" dirty="0" smtClean="0"/>
           </a:p>
           <a:p>
             <a:r>
@@ -5393,7 +5741,6 @@
               <a:rPr lang="en-US" dirty="0" smtClean="0"/>
               <a:t> modules to SSC-32U using Software Serial</a:t>
             </a:r>
-            <a:endParaRPr lang="en-US" dirty="0" smtClean="0"/>
           </a:p>
         </p:txBody>
       </p:sp>
@@ -6516,7 +6863,7 @@
           <p:nvPr/>
         </p:nvPicPr>
         <p:blipFill>
-          <a:blip r:embed="rId2">
+          <a:blip r:embed="rId3">
             <a:extLst>
               <a:ext uri="{28A0092B-C50C-407E-A947-70E740481C1C}">
                 <a14:useLocalDpi xmlns:a14="http://schemas.microsoft.com/office/drawing/2010/main" val="0"/>
@@ -6795,7 +7142,7 @@
           <p:nvPr/>
         </p:nvPicPr>
         <p:blipFill>
-          <a:blip r:embed="rId2" cstate="print">
+          <a:blip r:embed="rId3" cstate="print">
             <a:extLst>
               <a:ext uri="{28A0092B-C50C-407E-A947-70E740481C1C}">
                 <a14:useLocalDpi xmlns:a14="http://schemas.microsoft.com/office/drawing/2010/main" val="0"/>
@@ -6904,11 +7251,7 @@
           <a:p>
             <a:r>
               <a:rPr lang="en-US" dirty="0" smtClean="0"/>
-              <a:t>Accepts string </a:t>
-            </a:r>
-            <a:r>
-              <a:rPr lang="en-US" dirty="0" smtClean="0"/>
-              <a:t>commands</a:t>
+              <a:t>Accepts string commands</a:t>
             </a:r>
           </a:p>
           <a:p>
@@ -6917,7 +7260,6 @@
               <a:rPr lang="en-US" dirty="0" smtClean="0"/>
               <a:t>#0 P1500 S500 T1000</a:t>
             </a:r>
-            <a:endParaRPr lang="en-US" dirty="0" smtClean="0"/>
           </a:p>
           <a:p>
             <a:r>
@@ -6930,16 +7272,11 @@
               <a:rPr lang="en-US" dirty="0" smtClean="0"/>
               <a:t>Requires 6Vdc</a:t>
             </a:r>
-            <a:endParaRPr lang="en-US" dirty="0" smtClean="0"/>
-          </a:p>
-          <a:p>
-            <a:r>
-              <a:rPr lang="en-US" dirty="0" smtClean="0"/>
-              <a:t>We use 9600 </a:t>
-            </a:r>
-            <a:r>
-              <a:rPr lang="en-US" dirty="0" smtClean="0"/>
-              <a:t>Baud rate</a:t>
+          </a:p>
+          <a:p>
+            <a:r>
+              <a:rPr lang="en-US" dirty="0" smtClean="0"/>
+              <a:t>We use 9600 Baud rate</a:t>
             </a:r>
             <a:endParaRPr lang="en-US" dirty="0"/>
           </a:p>
@@ -7064,11 +7401,7 @@
             </a:r>
             <a:r>
               <a:rPr lang="en-US" dirty="0" smtClean="0"/>
-              <a:t> continuous servos, one for each wheel (4WD</a:t>
-            </a:r>
-            <a:r>
-              <a:rPr lang="en-US" dirty="0" smtClean="0"/>
-              <a:t>)</a:t>
+              <a:t> continuous servos, one for each wheel (4WD)</a:t>
             </a:r>
           </a:p>
           <a:p>
@@ -7086,7 +7419,6 @@
               <a:rPr lang="en-US" dirty="0" smtClean="0"/>
               <a:t> 5.8 GHz transmitter and receiver</a:t>
             </a:r>
-            <a:endParaRPr lang="en-US" dirty="0" smtClean="0"/>
           </a:p>
         </p:txBody>
       </p:sp>
@@ -7196,11 +7528,7 @@
           <a:p>
             <a:r>
               <a:rPr lang="en-US" dirty="0" smtClean="0"/>
-              <a:t>Uses an ATmega328 </a:t>
-            </a:r>
-            <a:r>
-              <a:rPr lang="en-US" dirty="0" smtClean="0"/>
-              <a:t>processor</a:t>
+              <a:t>Uses an ATmega328 processor</a:t>
             </a:r>
           </a:p>
           <a:p>
@@ -7214,11 +7542,7 @@
             </a:r>
             <a:r>
               <a:rPr lang="en-US" dirty="0" smtClean="0"/>
-              <a:t> for serial communication </a:t>
-            </a:r>
-            <a:r>
-              <a:rPr lang="en-US" dirty="0" smtClean="0"/>
-              <a:t>with PC</a:t>
+              <a:t> for serial communication with PC</a:t>
             </a:r>
           </a:p>
           <a:p>
@@ -7250,7 +7574,6 @@
               <a:rPr lang="en-US" dirty="0" smtClean="0"/>
               <a:t>)</a:t>
             </a:r>
-            <a:endParaRPr lang="en-US" dirty="0" smtClean="0"/>
           </a:p>
         </p:txBody>
       </p:sp>
@@ -7347,16 +7670,11 @@
               <a:rPr lang="en-US" dirty="0" smtClean="0"/>
               <a:t>Range from 40 to 100 meters</a:t>
             </a:r>
-            <a:endParaRPr lang="en-US" dirty="0" smtClean="0"/>
-          </a:p>
-          <a:p>
-            <a:r>
-              <a:rPr lang="en-US" dirty="0" smtClean="0"/>
-              <a:t>Created </a:t>
-            </a:r>
-            <a:r>
-              <a:rPr lang="en-US" dirty="0" smtClean="0"/>
-              <a:t>custom Arduino shield for </a:t>
+          </a:p>
+          <a:p>
+            <a:r>
+              <a:rPr lang="en-US" dirty="0" smtClean="0"/>
+              <a:t>Created custom Arduino shield for </a:t>
             </a:r>
             <a:r>
               <a:rPr lang="en-US" dirty="0" err="1" smtClean="0"/>
@@ -7367,21 +7685,8 @@
           <a:p>
             <a:r>
               <a:rPr lang="en-US" dirty="0" smtClean="0"/>
-              <a:t>Used X-CTU to c</a:t>
-            </a:r>
-            <a:r>
-              <a:rPr lang="en-US" dirty="0" smtClean="0"/>
-              <a:t>onfigure </a:t>
-            </a:r>
-            <a:r>
-              <a:rPr lang="en-US" dirty="0" smtClean="0"/>
-              <a:t>transmitter and </a:t>
-            </a:r>
-            <a:r>
-              <a:rPr lang="en-US" dirty="0" smtClean="0"/>
-              <a:t>receiver</a:t>
-            </a:r>
-            <a:endParaRPr lang="en-US" dirty="0" smtClean="0"/>
+              <a:t>Used X-CTU to configure transmitter and receiver</a:t>
+            </a:r>
           </a:p>
         </p:txBody>
       </p:sp>

</xml_diff>

<commit_message>
added github to presentation
</commit_message>
<xml_diff>
--- a/Documents/Presentation/Presentation_MobileMotionTrackingRobotArm.pptx
+++ b/Documents/Presentation/Presentation_MobileMotionTrackingRobotArm.pptx
@@ -5,7 +5,7 @@
     <p:sldMasterId id="2147483684" r:id="rId1"/>
   </p:sldMasterIdLst>
   <p:notesMasterIdLst>
-    <p:notesMasterId r:id="rId19"/>
+    <p:notesMasterId r:id="rId20"/>
   </p:notesMasterIdLst>
   <p:sldIdLst>
     <p:sldId id="256" r:id="rId2"/>
@@ -23,8 +23,9 @@
     <p:sldId id="275" r:id="rId14"/>
     <p:sldId id="265" r:id="rId15"/>
     <p:sldId id="260" r:id="rId16"/>
-    <p:sldId id="261" r:id="rId17"/>
-    <p:sldId id="276" r:id="rId18"/>
+    <p:sldId id="277" r:id="rId17"/>
+    <p:sldId id="261" r:id="rId18"/>
+    <p:sldId id="276" r:id="rId19"/>
   </p:sldIdLst>
   <p:sldSz cx="9144000" cy="6858000" type="screen4x3"/>
   <p:notesSz cx="6858000" cy="9144000"/>
@@ -626,11 +627,7 @@
             </a:pPr>
             <a:r>
               <a:rPr lang="en-US" dirty="0" smtClean="0"/>
-              <a:t>Kinect </a:t>
-            </a:r>
-            <a:r>
-              <a:rPr lang="en-US" dirty="0" smtClean="0"/>
-              <a:t>SDK has skeleton stream – stores information about each joint (coordinates)</a:t>
+              <a:t>Kinect SDK has skeleton stream – stores information about each joint (coordinates)</a:t>
             </a:r>
           </a:p>
           <a:p>
@@ -7149,6 +7146,81 @@
           <a:p>
             <a:r>
               <a:rPr lang="en-US" dirty="0" smtClean="0"/>
+              <a:t>GitHub</a:t>
+            </a:r>
+            <a:endParaRPr lang="en-US" dirty="0"/>
+          </a:p>
+        </p:txBody>
+      </p:sp>
+      <p:sp>
+        <p:nvSpPr>
+          <p:cNvPr id="3" name="Content Placeholder 2"/>
+          <p:cNvSpPr>
+            <a:spLocks noGrp="1"/>
+          </p:cNvSpPr>
+          <p:nvPr>
+            <p:ph idx="1"/>
+          </p:nvPr>
+        </p:nvSpPr>
+        <p:spPr/>
+        <p:txBody>
+          <a:bodyPr/>
+          <a:lstStyle/>
+          <a:p>
+            <a:r>
+              <a:rPr lang="en-US" dirty="0"/>
+              <a:t>https://github.com/StormWulf/Mobile-Motion-Tracking-Robot-Arm</a:t>
+            </a:r>
+          </a:p>
+        </p:txBody>
+      </p:sp>
+    </p:spTree>
+    <p:extLst>
+      <p:ext uri="{BB962C8B-B14F-4D97-AF65-F5344CB8AC3E}">
+        <p14:creationId xmlns:p14="http://schemas.microsoft.com/office/powerpoint/2010/main" val="3160293065"/>
+      </p:ext>
+    </p:extLst>
+  </p:cSld>
+  <p:clrMapOvr>
+    <a:masterClrMapping/>
+  </p:clrMapOvr>
+</p:sld>
+</file>
+
+<file path=ppt/slides/slide17.xml><?xml version="1.0" encoding="utf-8"?>
+<p:sld xmlns:a="http://schemas.openxmlformats.org/drawingml/2006/main" xmlns:r="http://schemas.openxmlformats.org/officeDocument/2006/relationships" xmlns:p="http://schemas.openxmlformats.org/presentationml/2006/main">
+  <p:cSld>
+    <p:spTree>
+      <p:nvGrpSpPr>
+        <p:cNvPr id="1" name=""/>
+        <p:cNvGrpSpPr/>
+        <p:nvPr/>
+      </p:nvGrpSpPr>
+      <p:grpSpPr>
+        <a:xfrm>
+          <a:off x="0" y="0"/>
+          <a:ext cx="0" cy="0"/>
+          <a:chOff x="0" y="0"/>
+          <a:chExt cx="0" cy="0"/>
+        </a:xfrm>
+      </p:grpSpPr>
+      <p:sp>
+        <p:nvSpPr>
+          <p:cNvPr id="2" name="Title 1"/>
+          <p:cNvSpPr>
+            <a:spLocks noGrp="1"/>
+          </p:cNvSpPr>
+          <p:nvPr>
+            <p:ph type="title"/>
+          </p:nvPr>
+        </p:nvSpPr>
+        <p:spPr/>
+        <p:txBody>
+          <a:bodyPr/>
+          <a:lstStyle/>
+          <a:p>
+            <a:r>
+              <a:rPr lang="en-US" dirty="0" smtClean="0"/>
               <a:t>References</a:t>
             </a:r>
             <a:endParaRPr lang="en-US" dirty="0"/>
@@ -7556,7 +7628,7 @@
 </p:sld>
 </file>
 
-<file path=ppt/slides/slide17.xml><?xml version="1.0" encoding="utf-8"?>
+<file path=ppt/slides/slide18.xml><?xml version="1.0" encoding="utf-8"?>
 <p:sld xmlns:a="http://schemas.openxmlformats.org/drawingml/2006/main" xmlns:r="http://schemas.openxmlformats.org/officeDocument/2006/relationships" xmlns:p="http://schemas.openxmlformats.org/presentationml/2006/main">
   <p:cSld>
     <p:spTree>
@@ -8161,11 +8233,7 @@
           <a:p>
             <a:r>
               <a:rPr lang="en-US" dirty="0" smtClean="0"/>
-              <a:t>3-pin </a:t>
-            </a:r>
-            <a:r>
-              <a:rPr lang="en-US" dirty="0" smtClean="0"/>
-              <a:t>servo connector</a:t>
+              <a:t>3-pin servo connector</a:t>
             </a:r>
           </a:p>
           <a:p>
@@ -8193,7 +8261,6 @@
               <a:rPr lang="en-US" dirty="0" smtClean="0"/>
               <a:t> modules</a:t>
             </a:r>
-            <a:endParaRPr lang="en-US" dirty="0" smtClean="0"/>
           </a:p>
           <a:p>
             <a:r>

</xml_diff>

<commit_message>
added notes for some slides
</commit_message>
<xml_diff>
--- a/Documents/Presentation/Presentation_MobileMotionTrackingRobotArm.pptx
+++ b/Documents/Presentation/Presentation_MobileMotionTrackingRobotArm.pptx
@@ -537,6 +537,28 @@
           <a:bodyPr/>
           <a:lstStyle/>
           <a:p>
+            <a:pPr marL="171450" indent="-171450">
+              <a:buFont typeface="Arial" panose="020B0604020202020204" pitchFamily="34" charset="0"/>
+              <a:buChar char="•"/>
+            </a:pPr>
+            <a:r>
+              <a:rPr lang="en-US" dirty="0" smtClean="0"/>
+              <a:t>Be able to control from a distance.</a:t>
+            </a:r>
+            <a:r>
+              <a:rPr lang="en-US" baseline="0" dirty="0" smtClean="0"/>
+              <a:t>  Final test for us was to drive to a distance object, pick it up, and bring it back – project is success</a:t>
+            </a:r>
+          </a:p>
+          <a:p>
+            <a:pPr marL="171450" indent="-171450">
+              <a:buFont typeface="Arial" panose="020B0604020202020204" pitchFamily="34" charset="0"/>
+              <a:buChar char="•"/>
+            </a:pPr>
+            <a:r>
+              <a:rPr lang="en-US" baseline="0" dirty="0" smtClean="0"/>
+              <a:t>Prototype for future device that could be used in situations that are not safe for humans</a:t>
+            </a:r>
             <a:endParaRPr lang="en-US" dirty="0"/>
           </a:p>
         </p:txBody>
@@ -627,7 +649,7 @@
             </a:pPr>
             <a:r>
               <a:rPr lang="en-US" dirty="0" smtClean="0"/>
-              <a:t>Kinect SDK has skeleton stream – stores information about each joint (coordinates)</a:t>
+              <a:t>Use skeletal tracking to achieve motion tracking</a:t>
             </a:r>
           </a:p>
           <a:p>
@@ -637,7 +659,7 @@
             </a:pPr>
             <a:r>
               <a:rPr lang="en-US" dirty="0" smtClean="0"/>
-              <a:t>Filter out right hand joint</a:t>
+              <a:t>Kinect SDK has skeleton stream – stores information about each joint (coordinates)</a:t>
             </a:r>
           </a:p>
           <a:p>
@@ -660,6 +682,35 @@
             <a:r>
               <a:rPr lang="en-US" baseline="0" dirty="0" smtClean="0"/>
               <a:t> gives x coordinate</a:t>
+            </a:r>
+            <a:endParaRPr lang="en-US" dirty="0" smtClean="0"/>
+          </a:p>
+          <a:p>
+            <a:pPr marL="171450" indent="-171450">
+              <a:buFont typeface="Arial" panose="020B0604020202020204" pitchFamily="34" charset="0"/>
+              <a:buChar char="•"/>
+            </a:pPr>
+            <a:r>
+              <a:rPr lang="en-US" dirty="0" smtClean="0"/>
+              <a:t>Filter </a:t>
+            </a:r>
+            <a:r>
+              <a:rPr lang="en-US" dirty="0" smtClean="0"/>
+              <a:t>out right hand </a:t>
+            </a:r>
+            <a:r>
+              <a:rPr lang="en-US" dirty="0" smtClean="0"/>
+              <a:t>joint</a:t>
+            </a:r>
+          </a:p>
+          <a:p>
+            <a:pPr marL="171450" indent="-171450">
+              <a:buFont typeface="Arial" panose="020B0604020202020204" pitchFamily="34" charset="0"/>
+              <a:buChar char="•"/>
+            </a:pPr>
+            <a:r>
+              <a:rPr lang="en-US" dirty="0" smtClean="0"/>
+              <a:t>Write to Arduino port – comma delimiter</a:t>
             </a:r>
           </a:p>
           <a:p>
@@ -805,11 +856,66 @@
             </a:pPr>
             <a:r>
               <a:rPr lang="en-US" dirty="0" smtClean="0"/>
-              <a:t>Linear regression: max and min</a:t>
+              <a:t>Linear regression: </a:t>
+            </a:r>
+            <a:r>
+              <a:rPr lang="en-US" dirty="0" smtClean="0"/>
+              <a:t>set max </a:t>
+            </a:r>
+            <a:r>
+              <a:rPr lang="en-US" dirty="0" smtClean="0"/>
+              <a:t>and min</a:t>
             </a:r>
             <a:r>
               <a:rPr lang="en-US" baseline="0" dirty="0" smtClean="0"/>
-              <a:t> ranges of Kinect and arm used to find slope and intercept for our equations</a:t>
+              <a:t> </a:t>
+            </a:r>
+            <a:r>
+              <a:rPr lang="en-US" baseline="0" dirty="0" smtClean="0"/>
+              <a:t>values for </a:t>
+            </a:r>
+            <a:r>
+              <a:rPr lang="en-US" baseline="0" dirty="0" smtClean="0"/>
+              <a:t>Kinect and arm </a:t>
+            </a:r>
+            <a:r>
+              <a:rPr lang="en-US" baseline="0" dirty="0" smtClean="0"/>
+              <a:t>and use them to </a:t>
+            </a:r>
+            <a:r>
+              <a:rPr lang="en-US" baseline="0" dirty="0" smtClean="0"/>
+              <a:t>find slope and intercept for our </a:t>
+            </a:r>
+            <a:r>
+              <a:rPr lang="en-US" baseline="0" dirty="0" smtClean="0"/>
+              <a:t>equations</a:t>
+            </a:r>
+          </a:p>
+          <a:p>
+            <a:pPr marL="171450" marR="0" indent="-171450" algn="l" defTabSz="914400" rtl="0" eaLnBrk="1" fontAlgn="auto" latinLnBrk="0" hangingPunct="1">
+              <a:lnSpc>
+                <a:spcPct val="100000"/>
+              </a:lnSpc>
+              <a:spcBef>
+                <a:spcPts val="0"/>
+              </a:spcBef>
+              <a:spcAft>
+                <a:spcPts val="0"/>
+              </a:spcAft>
+              <a:buClrTx/>
+              <a:buSzTx/>
+              <a:buFont typeface="Arial" panose="020B0604020202020204" pitchFamily="34" charset="0"/>
+              <a:buChar char="•"/>
+              <a:tabLst/>
+              <a:defRPr/>
+            </a:pPr>
+            <a:r>
+              <a:rPr lang="en-US" baseline="0" dirty="0" smtClean="0"/>
+              <a:t>Kinect coordinate measured as distance from Kinect – won’t work for arm.  </a:t>
+            </a:r>
+            <a:r>
+              <a:rPr lang="en-US" baseline="0" smtClean="0"/>
+              <a:t>Scale down to inches</a:t>
             </a:r>
             <a:endParaRPr lang="en-US" dirty="0" smtClean="0"/>
           </a:p>
@@ -842,6 +948,205 @@
     <p:extLst>
       <p:ext uri="{BB962C8B-B14F-4D97-AF65-F5344CB8AC3E}">
         <p14:creationId xmlns:p14="http://schemas.microsoft.com/office/powerpoint/2010/main" val="3501235008"/>
+      </p:ext>
+    </p:extLst>
+  </p:cSld>
+  <p:clrMapOvr>
+    <a:masterClrMapping/>
+  </p:clrMapOvr>
+</p:notes>
+</file>
+
+<file path=ppt/notesSlides/notesSlide12.xml><?xml version="1.0" encoding="utf-8"?>
+<p:notes xmlns:a="http://schemas.openxmlformats.org/drawingml/2006/main" xmlns:r="http://schemas.openxmlformats.org/officeDocument/2006/relationships" xmlns:p="http://schemas.openxmlformats.org/presentationml/2006/main">
+  <p:cSld>
+    <p:spTree>
+      <p:nvGrpSpPr>
+        <p:cNvPr id="1" name=""/>
+        <p:cNvGrpSpPr/>
+        <p:nvPr/>
+      </p:nvGrpSpPr>
+      <p:grpSpPr>
+        <a:xfrm>
+          <a:off x="0" y="0"/>
+          <a:ext cx="0" cy="0"/>
+          <a:chOff x="0" y="0"/>
+          <a:chExt cx="0" cy="0"/>
+        </a:xfrm>
+      </p:grpSpPr>
+      <p:sp>
+        <p:nvSpPr>
+          <p:cNvPr id="2" name="Slide Image Placeholder 1"/>
+          <p:cNvSpPr>
+            <a:spLocks noGrp="1" noRot="1" noChangeAspect="1"/>
+          </p:cNvSpPr>
+          <p:nvPr>
+            <p:ph type="sldImg"/>
+          </p:nvPr>
+        </p:nvSpPr>
+        <p:spPr/>
+      </p:sp>
+      <p:sp>
+        <p:nvSpPr>
+          <p:cNvPr id="3" name="Notes Placeholder 2"/>
+          <p:cNvSpPr>
+            <a:spLocks noGrp="1"/>
+          </p:cNvSpPr>
+          <p:nvPr>
+            <p:ph type="body" idx="1"/>
+          </p:nvPr>
+        </p:nvSpPr>
+        <p:spPr/>
+        <p:txBody>
+          <a:bodyPr/>
+          <a:lstStyle/>
+          <a:p>
+            <a:pPr marL="171450" indent="-171450">
+              <a:buFont typeface="Arial" panose="020B0604020202020204" pitchFamily="34" charset="0"/>
+              <a:buChar char="•"/>
+            </a:pPr>
+            <a:r>
+              <a:rPr lang="en-US" dirty="0" smtClean="0"/>
+              <a:t>Geometry</a:t>
+            </a:r>
+          </a:p>
+          <a:p>
+            <a:pPr marL="171450" indent="-171450">
+              <a:buFont typeface="Arial" panose="020B0604020202020204" pitchFamily="34" charset="0"/>
+              <a:buChar char="•"/>
+            </a:pPr>
+            <a:r>
+              <a:rPr lang="en-US" dirty="0" smtClean="0"/>
+              <a:t>Hand</a:t>
+            </a:r>
+            <a:r>
+              <a:rPr lang="en-US" baseline="0" dirty="0" smtClean="0"/>
+              <a:t> – length of hand, ulna – length of ulna, etc.</a:t>
+            </a:r>
+            <a:endParaRPr lang="en-US" dirty="0" smtClean="0"/>
+          </a:p>
+          <a:p>
+            <a:pPr marL="171450" indent="-171450">
+              <a:buFont typeface="Arial" panose="020B0604020202020204" pitchFamily="34" charset="0"/>
+              <a:buChar char="•"/>
+            </a:pPr>
+            <a:r>
+              <a:rPr lang="en-US" dirty="0" smtClean="0"/>
+              <a:t>Tell</a:t>
+            </a:r>
+            <a:r>
+              <a:rPr lang="en-US" baseline="0" dirty="0" smtClean="0"/>
+              <a:t> it where hand should be</a:t>
+            </a:r>
+          </a:p>
+          <a:p>
+            <a:pPr marL="171450" indent="-171450">
+              <a:buFont typeface="Arial" panose="020B0604020202020204" pitchFamily="34" charset="0"/>
+              <a:buChar char="•"/>
+            </a:pPr>
+            <a:r>
+              <a:rPr lang="en-US" baseline="0" dirty="0" smtClean="0"/>
+              <a:t>Finds where wrist should be based on length of robot’s hand</a:t>
+            </a:r>
+          </a:p>
+          <a:p>
+            <a:pPr marL="171450" indent="-171450">
+              <a:buFont typeface="Arial" panose="020B0604020202020204" pitchFamily="34" charset="0"/>
+              <a:buChar char="•"/>
+            </a:pPr>
+            <a:r>
+              <a:rPr lang="en-US" baseline="0" dirty="0" err="1" smtClean="0"/>
+              <a:t>sw</a:t>
+            </a:r>
+            <a:r>
+              <a:rPr lang="en-US" baseline="0" dirty="0" smtClean="0"/>
+              <a:t> - Finds distance between shoulder and wrist, think of it as a line</a:t>
+            </a:r>
+          </a:p>
+          <a:p>
+            <a:pPr marL="171450" indent="-171450">
+              <a:buFont typeface="Arial" panose="020B0604020202020204" pitchFamily="34" charset="0"/>
+              <a:buChar char="•"/>
+            </a:pPr>
+            <a:r>
+              <a:rPr lang="en-US" baseline="0" dirty="0" smtClean="0"/>
+              <a:t>A1 - Finds angle b/w that line and ground</a:t>
+            </a:r>
+          </a:p>
+          <a:p>
+            <a:pPr marL="171450" indent="-171450">
+              <a:buFont typeface="Arial" panose="020B0604020202020204" pitchFamily="34" charset="0"/>
+              <a:buChar char="•"/>
+            </a:pPr>
+            <a:r>
+              <a:rPr lang="en-US" baseline="0" dirty="0" smtClean="0"/>
+              <a:t>A2 - Finds angle b/w that line and </a:t>
+            </a:r>
+            <a:r>
+              <a:rPr lang="en-US" baseline="0" dirty="0" err="1" smtClean="0"/>
+              <a:t>humerus</a:t>
+            </a:r>
+            <a:endParaRPr lang="en-US" baseline="0" dirty="0" smtClean="0"/>
+          </a:p>
+          <a:p>
+            <a:pPr marL="171450" indent="-171450">
+              <a:buFont typeface="Arial" panose="020B0604020202020204" pitchFamily="34" charset="0"/>
+              <a:buChar char="•"/>
+            </a:pPr>
+            <a:r>
+              <a:rPr lang="en-US" baseline="0" dirty="0" smtClean="0"/>
+              <a:t>Shoulder angle – A1 + A2</a:t>
+            </a:r>
+          </a:p>
+          <a:p>
+            <a:pPr marL="171450" indent="-171450">
+              <a:buFont typeface="Arial" panose="020B0604020202020204" pitchFamily="34" charset="0"/>
+              <a:buChar char="•"/>
+            </a:pPr>
+            <a:r>
+              <a:rPr lang="en-US" baseline="0" dirty="0" smtClean="0"/>
+              <a:t>Elbow angle</a:t>
+            </a:r>
+          </a:p>
+          <a:p>
+            <a:pPr marL="171450" indent="-171450">
+              <a:buFont typeface="Arial" panose="020B0604020202020204" pitchFamily="34" charset="0"/>
+              <a:buChar char="•"/>
+            </a:pPr>
+            <a:r>
+              <a:rPr lang="en-US" baseline="0" dirty="0" smtClean="0"/>
+              <a:t>Wrist maintains same angle to ground no matter what position the arm is in</a:t>
+            </a:r>
+          </a:p>
+        </p:txBody>
+      </p:sp>
+      <p:sp>
+        <p:nvSpPr>
+          <p:cNvPr id="4" name="Slide Number Placeholder 3"/>
+          <p:cNvSpPr>
+            <a:spLocks noGrp="1"/>
+          </p:cNvSpPr>
+          <p:nvPr>
+            <p:ph type="sldNum" sz="quarter" idx="10"/>
+          </p:nvPr>
+        </p:nvSpPr>
+        <p:spPr/>
+        <p:txBody>
+          <a:bodyPr/>
+          <a:lstStyle/>
+          <a:p>
+            <a:fld id="{3B17A12C-C4E2-4206-8C18-BBFF2A1087F6}" type="slidenum">
+              <a:rPr lang="en-US" smtClean="0"/>
+              <a:t>13</a:t>
+            </a:fld>
+            <a:endParaRPr lang="en-US"/>
+          </a:p>
+        </p:txBody>
+      </p:sp>
+    </p:spTree>
+    <p:extLst>
+      <p:ext uri="{BB962C8B-B14F-4D97-AF65-F5344CB8AC3E}">
+        <p14:creationId xmlns:p14="http://schemas.microsoft.com/office/powerpoint/2010/main" val="3000678493"/>
       </p:ext>
     </p:extLst>
   </p:cSld>
@@ -895,7 +1200,63 @@
           <a:bodyPr/>
           <a:lstStyle/>
           <a:p>
-            <a:endParaRPr lang="en-US" dirty="0"/>
+            <a:pPr marL="171450" indent="-171450">
+              <a:buFont typeface="Arial" panose="020B0604020202020204" pitchFamily="34" charset="0"/>
+              <a:buChar char="•"/>
+            </a:pPr>
+            <a:r>
+              <a:rPr lang="en-US" dirty="0" smtClean="0"/>
+              <a:t>Starts at Kinect</a:t>
+            </a:r>
+            <a:r>
+              <a:rPr lang="en-US" baseline="0" dirty="0" smtClean="0"/>
+              <a:t> – does motion tracking</a:t>
+            </a:r>
+          </a:p>
+          <a:p>
+            <a:pPr marL="171450" indent="-171450">
+              <a:buFont typeface="Arial" panose="020B0604020202020204" pitchFamily="34" charset="0"/>
+              <a:buChar char="•"/>
+            </a:pPr>
+            <a:r>
+              <a:rPr lang="en-US" baseline="0" dirty="0" smtClean="0"/>
+              <a:t>Communicates with SDK</a:t>
+            </a:r>
+          </a:p>
+          <a:p>
+            <a:pPr marL="171450" indent="-171450">
+              <a:buFont typeface="Arial" panose="020B0604020202020204" pitchFamily="34" charset="0"/>
+              <a:buChar char="•"/>
+            </a:pPr>
+            <a:r>
+              <a:rPr lang="en-US" baseline="0" dirty="0" smtClean="0"/>
+              <a:t>SDK sends coordinates for user’s hand to Arduino</a:t>
+            </a:r>
+          </a:p>
+          <a:p>
+            <a:pPr marL="171450" indent="-171450">
+              <a:buFont typeface="Arial" panose="020B0604020202020204" pitchFamily="34" charset="0"/>
+              <a:buChar char="•"/>
+            </a:pPr>
+            <a:r>
+              <a:rPr lang="en-US" baseline="0" dirty="0" smtClean="0"/>
+              <a:t>Arduino translates coordinates into servo positions</a:t>
+            </a:r>
+          </a:p>
+          <a:p>
+            <a:pPr marL="171450" indent="-171450">
+              <a:buFont typeface="Arial" panose="020B0604020202020204" pitchFamily="34" charset="0"/>
+              <a:buChar char="•"/>
+            </a:pPr>
+            <a:r>
+              <a:rPr lang="en-US" baseline="0" dirty="0" smtClean="0"/>
+              <a:t>Arduino sends commands to SSC-32U through wireless </a:t>
+            </a:r>
+            <a:r>
+              <a:rPr lang="en-US" baseline="0" dirty="0" err="1" smtClean="0"/>
+              <a:t>Xbees</a:t>
+            </a:r>
+            <a:endParaRPr lang="en-US" baseline="0" dirty="0" smtClean="0"/>
           </a:p>
         </p:txBody>
       </p:sp>
@@ -1026,7 +1387,34 @@
             </a:r>
             <a:r>
               <a:rPr lang="en-US" baseline="0" dirty="0" smtClean="0"/>
-              <a:t> to determine body positions in the room.</a:t>
+              <a:t> to determine body positions in the room</a:t>
+            </a:r>
+            <a:r>
+              <a:rPr lang="en-US" baseline="0" dirty="0" smtClean="0"/>
+              <a:t>.</a:t>
+            </a:r>
+          </a:p>
+          <a:p>
+            <a:pPr marL="171450" marR="0" indent="-171450" algn="l" defTabSz="914400" rtl="0" eaLnBrk="1" fontAlgn="auto" latinLnBrk="0" hangingPunct="1">
+              <a:lnSpc>
+                <a:spcPct val="100000"/>
+              </a:lnSpc>
+              <a:spcBef>
+                <a:spcPts val="0"/>
+              </a:spcBef>
+              <a:spcAft>
+                <a:spcPts val="0"/>
+              </a:spcAft>
+              <a:buClrTx/>
+              <a:buSzTx/>
+              <a:buFont typeface="Arial" panose="020B0604020202020204" pitchFamily="34" charset="0"/>
+              <a:buChar char="•"/>
+              <a:tabLst/>
+              <a:defRPr/>
+            </a:pPr>
+            <a:r>
+              <a:rPr lang="en-US" baseline="0" dirty="0" smtClean="0"/>
+              <a:t>Use SDK to extract coordinates from joints</a:t>
             </a:r>
             <a:endParaRPr lang="en-US" dirty="0" smtClean="0"/>
           </a:p>
@@ -1122,9 +1510,12 @@
             </a:r>
             <a:r>
               <a:rPr lang="en-US" baseline="0" dirty="0" smtClean="0"/>
-              <a:t> tracking with Kinect not reliable enough to allow wrist movement on arm</a:t>
-            </a:r>
-            <a:endParaRPr lang="en-US" dirty="0"/>
+              <a:t> tracking with Kinect not reliable enough to allow wrist movement on </a:t>
+            </a:r>
+            <a:r>
+              <a:rPr lang="en-US" baseline="0" dirty="0" smtClean="0"/>
+              <a:t>arm</a:t>
+            </a:r>
           </a:p>
         </p:txBody>
       </p:sp>
@@ -6279,24 +6670,22 @@
       </p:sp>
       <p:pic>
         <p:nvPicPr>
-          <p:cNvPr id="4" name="Content Placeholder 3"/>
+          <p:cNvPr id="5" name="Picture 4"/>
           <p:cNvPicPr>
-            <a:picLocks noGrp="1"/>
+            <a:picLocks noChangeAspect="1"/>
           </p:cNvPicPr>
-          <p:nvPr>
-            <p:ph idx="1"/>
-          </p:nvPr>
+          <p:nvPr/>
         </p:nvPicPr>
         <p:blipFill>
-          <a:blip r:embed="rId2"/>
+          <a:blip r:embed="rId3"/>
           <a:stretch>
             <a:fillRect/>
           </a:stretch>
         </p:blipFill>
         <p:spPr>
           <a:xfrm>
-            <a:off x="931068" y="2590800"/>
-            <a:ext cx="7396163" cy="3190875"/>
+            <a:off x="894052" y="2514600"/>
+            <a:ext cx="7470195" cy="3171825"/>
           </a:xfrm>
           <a:prstGeom prst="rect">
             <a:avLst/>

</xml_diff>